<commit_message>
Update Team 3-Machine Learning For Loops Presentation.pptx
</commit_message>
<xml_diff>
--- a/Team 3-Machine Learning For Loops Presentation.pptx
+++ b/Team 3-Machine Learning For Loops Presentation.pptx
@@ -17074,7 +17074,7 @@
                 <a:cs typeface="Courier New"/>
                 <a:sym typeface="Courier New"/>
               </a:rPr>
-              <a:t>    print(paste("i = " , i, "; j = ", j))</a:t>
+              <a:t>    print(paste("k = " , i, "; j = ", j))</a:t>
             </a:r>
             <a:endParaRPr sz="2000">
               <a:latin typeface="Courier New"/>
@@ -17279,7 +17279,7 @@
                 <a:cs typeface="Courier New"/>
                 <a:sym typeface="Courier New"/>
               </a:rPr>
-              <a:t>[1] "i =  1 ; j =  1"</a:t>
+              <a:t>[1] "k =  1 ; j =  1"</a:t>
             </a:r>
             <a:endParaRPr sz="2040">
               <a:latin typeface="Courier New"/>
@@ -17313,7 +17313,7 @@
                 <a:cs typeface="Courier New"/>
                 <a:sym typeface="Courier New"/>
               </a:rPr>
-              <a:t>[1] "i =  1 ; j =  2"</a:t>
+              <a:t>[1] "k =  1 ; j =  2"</a:t>
             </a:r>
             <a:endParaRPr sz="2040">
               <a:latin typeface="Courier New"/>
@@ -17347,7 +17347,7 @@
                 <a:cs typeface="Courier New"/>
                 <a:sym typeface="Courier New"/>
               </a:rPr>
-              <a:t>[1] "i =  2 ; j =  1"</a:t>
+              <a:t>[1] "k =  2 ; j =  1"</a:t>
             </a:r>
             <a:endParaRPr sz="2040">
               <a:latin typeface="Courier New"/>
@@ -17381,7 +17381,7 @@
                 <a:cs typeface="Courier New"/>
                 <a:sym typeface="Courier New"/>
               </a:rPr>
-              <a:t>[1] "i =  2 ; j =  2"</a:t>
+              <a:t>[1] "k =  2 ; j =  2"</a:t>
             </a:r>
             <a:endParaRPr sz="2040">
               <a:latin typeface="Courier New"/>
@@ -17415,7 +17415,7 @@
                 <a:cs typeface="Courier New"/>
                 <a:sym typeface="Courier New"/>
               </a:rPr>
-              <a:t>[1] "i =  3 ; j =  1"</a:t>
+              <a:t>[1] "k =  3 ; j =  1"</a:t>
             </a:r>
             <a:endParaRPr sz="2040">
               <a:latin typeface="Courier New"/>
@@ -17449,7 +17449,7 @@
                 <a:cs typeface="Courier New"/>
                 <a:sym typeface="Courier New"/>
               </a:rPr>
-              <a:t>[1] "i =  3 ; j =  2"</a:t>
+              <a:t>[1] "k =  3 ; j =  2"</a:t>
             </a:r>
             <a:endParaRPr sz="2040">
               <a:latin typeface="Courier New"/>
@@ -17483,7 +17483,7 @@
                 <a:cs typeface="Courier New"/>
                 <a:sym typeface="Courier New"/>
               </a:rPr>
-              <a:t>[1] "i =  4 ; j =  1"</a:t>
+              <a:t>[1] "k =  4 ; j =  1"</a:t>
             </a:r>
             <a:endParaRPr sz="2040">
               <a:latin typeface="Courier New"/>
@@ -17517,7 +17517,7 @@
                 <a:cs typeface="Courier New"/>
                 <a:sym typeface="Courier New"/>
               </a:rPr>
-              <a:t>[1] "i =  4 ; j =  2"</a:t>
+              <a:t>[1] "k =  4 ; j =  2"</a:t>
             </a:r>
             <a:endParaRPr sz="2040">
               <a:latin typeface="Courier New"/>

</xml_diff>